<commit_message>
Finished docummenting join operators and revised some of the initial presentation.
</commit_message>
<xml_diff>
--- a/docs/img/graphx_figures.pptx
+++ b/docs/img/graphx_figures.pptx
@@ -15663,15 +15663,14 @@
                 <a:latin typeface="Gill Sans Light"/>
                 <a:cs typeface="Gill Sans Light"/>
               </a:rPr>
-              <a:t>Rxin</a:t>
+              <a:t>rxin</a:t>
             </a:r>
-            <a:r>
-              <a:rPr lang="en-US" dirty="0" smtClean="0">
-                <a:latin typeface="Gill Sans Light"/>
-                <a:cs typeface="Gill Sans Light"/>
-              </a:rPr>
-              <a:t> </a:t>
-            </a:r>
+            <a:endParaRPr lang="en-US" dirty="0">
+              <a:latin typeface="Gill Sans Light"/>
+              <a:cs typeface="Gill Sans Light"/>
+            </a:endParaRPr>
+          </a:p>
+          <a:p>
             <a:r>
               <a:rPr lang="en-US" dirty="0" err="1" smtClean="0">
                 <a:latin typeface="Gill Sans Light"/>

</xml_diff>